<commit_message>
uncommented the send email function for new users
</commit_message>
<xml_diff>
--- a/zakat.icclmd.team/zakat.icclmd.org.pptx
+++ b/zakat.icclmd.team/zakat.icclmd.org.pptx
@@ -284,7 +284,7 @@
           <a:p>
             <a:fld id="{919D266F-1832-4AED-95A7-DB500E667DE8}" type="datetimeFigureOut">
               <a:rPr lang="en-US" smtClean="0"/>
-              <a:t>3/1/2020</a:t>
+              <a:t>3/22/2020</a:t>
             </a:fld>
             <a:endParaRPr lang="en-US"/>
           </a:p>
@@ -482,7 +482,7 @@
           <a:p>
             <a:fld id="{919D266F-1832-4AED-95A7-DB500E667DE8}" type="datetimeFigureOut">
               <a:rPr lang="en-US" smtClean="0"/>
-              <a:t>3/1/2020</a:t>
+              <a:t>3/22/2020</a:t>
             </a:fld>
             <a:endParaRPr lang="en-US"/>
           </a:p>
@@ -690,7 +690,7 @@
           <a:p>
             <a:fld id="{919D266F-1832-4AED-95A7-DB500E667DE8}" type="datetimeFigureOut">
               <a:rPr lang="en-US" smtClean="0"/>
-              <a:t>3/1/2020</a:t>
+              <a:t>3/22/2020</a:t>
             </a:fld>
             <a:endParaRPr lang="en-US"/>
           </a:p>
@@ -888,7 +888,7 @@
           <a:p>
             <a:fld id="{919D266F-1832-4AED-95A7-DB500E667DE8}" type="datetimeFigureOut">
               <a:rPr lang="en-US" smtClean="0"/>
-              <a:t>3/1/2020</a:t>
+              <a:t>3/22/2020</a:t>
             </a:fld>
             <a:endParaRPr lang="en-US"/>
           </a:p>
@@ -1163,7 +1163,7 @@
           <a:p>
             <a:fld id="{919D266F-1832-4AED-95A7-DB500E667DE8}" type="datetimeFigureOut">
               <a:rPr lang="en-US" smtClean="0"/>
-              <a:t>3/1/2020</a:t>
+              <a:t>3/22/2020</a:t>
             </a:fld>
             <a:endParaRPr lang="en-US"/>
           </a:p>
@@ -1428,7 +1428,7 @@
           <a:p>
             <a:fld id="{919D266F-1832-4AED-95A7-DB500E667DE8}" type="datetimeFigureOut">
               <a:rPr lang="en-US" smtClean="0"/>
-              <a:t>3/1/2020</a:t>
+              <a:t>3/22/2020</a:t>
             </a:fld>
             <a:endParaRPr lang="en-US"/>
           </a:p>
@@ -1840,7 +1840,7 @@
           <a:p>
             <a:fld id="{919D266F-1832-4AED-95A7-DB500E667DE8}" type="datetimeFigureOut">
               <a:rPr lang="en-US" smtClean="0"/>
-              <a:t>3/1/2020</a:t>
+              <a:t>3/22/2020</a:t>
             </a:fld>
             <a:endParaRPr lang="en-US"/>
           </a:p>
@@ -1981,7 +1981,7 @@
           <a:p>
             <a:fld id="{919D266F-1832-4AED-95A7-DB500E667DE8}" type="datetimeFigureOut">
               <a:rPr lang="en-US" smtClean="0"/>
-              <a:t>3/1/2020</a:t>
+              <a:t>3/22/2020</a:t>
             </a:fld>
             <a:endParaRPr lang="en-US"/>
           </a:p>
@@ -2094,7 +2094,7 @@
           <a:p>
             <a:fld id="{919D266F-1832-4AED-95A7-DB500E667DE8}" type="datetimeFigureOut">
               <a:rPr lang="en-US" smtClean="0"/>
-              <a:t>3/1/2020</a:t>
+              <a:t>3/22/2020</a:t>
             </a:fld>
             <a:endParaRPr lang="en-US"/>
           </a:p>
@@ -2405,7 +2405,7 @@
           <a:p>
             <a:fld id="{919D266F-1832-4AED-95A7-DB500E667DE8}" type="datetimeFigureOut">
               <a:rPr lang="en-US" smtClean="0"/>
-              <a:t>3/1/2020</a:t>
+              <a:t>3/22/2020</a:t>
             </a:fld>
             <a:endParaRPr lang="en-US"/>
           </a:p>
@@ -2693,7 +2693,7 @@
           <a:p>
             <a:fld id="{919D266F-1832-4AED-95A7-DB500E667DE8}" type="datetimeFigureOut">
               <a:rPr lang="en-US" smtClean="0"/>
-              <a:t>3/1/2020</a:t>
+              <a:t>3/22/2020</a:t>
             </a:fld>
             <a:endParaRPr lang="en-US"/>
           </a:p>
@@ -2934,7 +2934,7 @@
           <a:p>
             <a:fld id="{919D266F-1832-4AED-95A7-DB500E667DE8}" type="datetimeFigureOut">
               <a:rPr lang="en-US" smtClean="0"/>
-              <a:t>3/1/2020</a:t>
+              <a:t>3/22/2020</a:t>
             </a:fld>
             <a:endParaRPr lang="en-US"/>
           </a:p>
@@ -3369,8 +3369,8 @@
         </p:nvSpPr>
         <p:spPr>
           <a:xfrm>
-            <a:off x="0" y="1"/>
-            <a:ext cx="6084837" cy="447574"/>
+            <a:off x="0" y="4738"/>
+            <a:ext cx="6084837" cy="316641"/>
           </a:xfrm>
         </p:spPr>
         <p:txBody>
@@ -3401,7 +3401,7 @@
         </p:nvSpPr>
         <p:spPr>
           <a:xfrm>
-            <a:off x="5622825" y="96250"/>
+            <a:off x="5622825" y="10966"/>
             <a:ext cx="914400" cy="640080"/>
           </a:xfrm>
           <a:prstGeom prst="rect">
@@ -3449,7 +3449,7 @@
         </p:nvSpPr>
         <p:spPr>
           <a:xfrm>
-            <a:off x="5629174" y="1201552"/>
+            <a:off x="5629174" y="1116268"/>
             <a:ext cx="914400" cy="640080"/>
           </a:xfrm>
           <a:prstGeom prst="rect">
@@ -3497,7 +3497,7 @@
         </p:nvSpPr>
         <p:spPr>
           <a:xfrm>
-            <a:off x="94279" y="1201552"/>
+            <a:off x="94279" y="1116268"/>
             <a:ext cx="914400" cy="640080"/>
           </a:xfrm>
           <a:prstGeom prst="rect">
@@ -3545,7 +3545,7 @@
         </p:nvSpPr>
         <p:spPr>
           <a:xfrm>
-            <a:off x="1762659" y="1201552"/>
+            <a:off x="1762659" y="1116268"/>
             <a:ext cx="914400" cy="640080"/>
           </a:xfrm>
           <a:prstGeom prst="rect">
@@ -3593,7 +3593,7 @@
         </p:nvSpPr>
         <p:spPr>
           <a:xfrm>
-            <a:off x="4562602" y="3372846"/>
+            <a:off x="4562602" y="3287562"/>
             <a:ext cx="914400" cy="640080"/>
           </a:xfrm>
           <a:prstGeom prst="rect">
@@ -3641,7 +3641,7 @@
         </p:nvSpPr>
         <p:spPr>
           <a:xfrm>
-            <a:off x="7891348" y="2228640"/>
+            <a:off x="7891348" y="2143356"/>
             <a:ext cx="914400" cy="640080"/>
           </a:xfrm>
           <a:prstGeom prst="rect">
@@ -3688,7 +3688,7 @@
         </p:nvSpPr>
         <p:spPr>
           <a:xfrm>
-            <a:off x="10616752" y="3322315"/>
+            <a:off x="10616752" y="3237031"/>
             <a:ext cx="914400" cy="640080"/>
           </a:xfrm>
           <a:prstGeom prst="rect">
@@ -3743,7 +3743,7 @@
         </p:nvSpPr>
         <p:spPr>
           <a:xfrm>
-            <a:off x="7890845" y="3363220"/>
+            <a:off x="7890845" y="3277936"/>
             <a:ext cx="914400" cy="640080"/>
           </a:xfrm>
           <a:prstGeom prst="rect">
@@ -3790,7 +3790,7 @@
         </p:nvSpPr>
         <p:spPr>
           <a:xfrm>
-            <a:off x="9114218" y="3322315"/>
+            <a:off x="9114218" y="3246507"/>
             <a:ext cx="914400" cy="640080"/>
           </a:xfrm>
           <a:prstGeom prst="rect">
@@ -3845,7 +3845,7 @@
         </p:nvSpPr>
         <p:spPr>
           <a:xfrm>
-            <a:off x="9883539" y="2228640"/>
+            <a:off x="9883539" y="2143356"/>
             <a:ext cx="914400" cy="640080"/>
           </a:xfrm>
           <a:prstGeom prst="rect">
@@ -3902,7 +3902,7 @@
         </p:nvCxnSpPr>
         <p:spPr>
           <a:xfrm rot="16200000" flipH="1">
-            <a:off x="5840963" y="956141"/>
+            <a:off x="5840963" y="870857"/>
             <a:ext cx="489286" cy="1535"/>
           </a:xfrm>
           <a:prstGeom prst="bentConnector3">
@@ -3945,7 +3945,7 @@
         </p:nvCxnSpPr>
         <p:spPr>
           <a:xfrm rot="10800000" flipV="1">
-            <a:off x="551479" y="416290"/>
+            <a:off x="551479" y="331006"/>
             <a:ext cx="5071346" cy="785262"/>
           </a:xfrm>
           <a:prstGeom prst="bentConnector2">
@@ -3988,7 +3988,7 @@
         </p:nvCxnSpPr>
         <p:spPr>
           <a:xfrm rot="10800000" flipV="1">
-            <a:off x="2219859" y="416290"/>
+            <a:off x="2219859" y="331006"/>
             <a:ext cx="3402966" cy="785262"/>
           </a:xfrm>
           <a:prstGeom prst="bentConnector2">
@@ -4031,7 +4031,7 @@
         </p:nvCxnSpPr>
         <p:spPr>
           <a:xfrm rot="10800000" flipV="1">
-            <a:off x="3731036" y="1521592"/>
+            <a:off x="3731036" y="1436308"/>
             <a:ext cx="1898139" cy="707048"/>
           </a:xfrm>
           <a:prstGeom prst="bentConnector2">
@@ -4071,7 +4071,7 @@
         </p:nvSpPr>
         <p:spPr>
           <a:xfrm>
-            <a:off x="3273835" y="2228640"/>
+            <a:off x="3273835" y="2143356"/>
             <a:ext cx="914400" cy="640080"/>
           </a:xfrm>
           <a:prstGeom prst="rect">
@@ -4122,7 +4122,7 @@
         </p:nvCxnSpPr>
         <p:spPr>
           <a:xfrm>
-            <a:off x="2677059" y="1521592"/>
+            <a:off x="2677059" y="1436308"/>
             <a:ext cx="1053976" cy="707048"/>
           </a:xfrm>
           <a:prstGeom prst="bentConnector2">
@@ -4161,7 +4161,7 @@
         </p:nvSpPr>
         <p:spPr>
           <a:xfrm>
-            <a:off x="2677060" y="1234718"/>
+            <a:off x="2677060" y="1149434"/>
             <a:ext cx="2944304" cy="253916"/>
           </a:xfrm>
           <a:prstGeom prst="rect">
@@ -4201,7 +4201,7 @@
         </p:nvCxnSpPr>
         <p:spPr>
           <a:xfrm>
-            <a:off x="10797939" y="2548680"/>
+            <a:off x="10797939" y="2463396"/>
             <a:ext cx="276013" cy="773635"/>
           </a:xfrm>
           <a:prstGeom prst="bentConnector2">
@@ -4244,8 +4244,8 @@
         </p:nvCxnSpPr>
         <p:spPr>
           <a:xfrm rot="10800000" flipV="1">
-            <a:off x="9571419" y="2548679"/>
-            <a:ext cx="312121" cy="773635"/>
+            <a:off x="9571419" y="2463395"/>
+            <a:ext cx="312121" cy="783111"/>
           </a:xfrm>
           <a:prstGeom prst="bentConnector2">
             <a:avLst/>
@@ -4284,7 +4284,7 @@
         </p:nvSpPr>
         <p:spPr>
           <a:xfrm>
-            <a:off x="3273835" y="3377659"/>
+            <a:off x="3273835" y="3292375"/>
             <a:ext cx="914400" cy="640080"/>
           </a:xfrm>
           <a:prstGeom prst="rect">
@@ -4335,7 +4335,7 @@
         </p:nvCxnSpPr>
         <p:spPr>
           <a:xfrm>
-            <a:off x="6543574" y="1521592"/>
+            <a:off x="6543574" y="1436308"/>
             <a:ext cx="1804974" cy="707048"/>
           </a:xfrm>
           <a:prstGeom prst="bentConnector2">
@@ -4378,7 +4378,7 @@
         </p:nvCxnSpPr>
         <p:spPr>
           <a:xfrm rot="16200000" flipH="1">
-            <a:off x="4123355" y="2476399"/>
+            <a:off x="4123355" y="2391115"/>
             <a:ext cx="504126" cy="1288767"/>
           </a:xfrm>
           <a:prstGeom prst="bentConnector3">
@@ -4423,7 +4423,7 @@
         </p:nvCxnSpPr>
         <p:spPr>
           <a:xfrm rot="5400000">
-            <a:off x="3476566" y="3123189"/>
+            <a:off x="3476566" y="3037905"/>
             <a:ext cx="508939" cy="12700"/>
           </a:xfrm>
           <a:prstGeom prst="bentConnector3">
@@ -4468,7 +4468,7 @@
         </p:nvCxnSpPr>
         <p:spPr>
           <a:xfrm>
-            <a:off x="6543574" y="1521592"/>
+            <a:off x="6543574" y="1436308"/>
             <a:ext cx="3797165" cy="707048"/>
           </a:xfrm>
           <a:prstGeom prst="bentConnector2">
@@ -4511,7 +4511,7 @@
         </p:nvCxnSpPr>
         <p:spPr>
           <a:xfrm rot="5400000">
-            <a:off x="8101047" y="3115719"/>
+            <a:off x="8101047" y="3030435"/>
             <a:ext cx="494500" cy="503"/>
           </a:xfrm>
           <a:prstGeom prst="bentConnector3">
@@ -4552,7 +4552,7 @@
         </p:nvSpPr>
         <p:spPr>
           <a:xfrm>
-            <a:off x="6545035" y="1255170"/>
+            <a:off x="6545035" y="1169886"/>
             <a:ext cx="3795703" cy="253916"/>
           </a:xfrm>
           <a:prstGeom prst="rect">
@@ -4589,14 +4589,14 @@
           <p:nvPr>
             <p:extLst>
               <p:ext uri="{D42A27DB-BD31-4B8C-83A1-F6EECF244321}">
-                <p14:modId xmlns:p14="http://schemas.microsoft.com/office/powerpoint/2010/main" val="2308293172"/>
+                <p14:modId xmlns:p14="http://schemas.microsoft.com/office/powerpoint/2010/main" val="2778188379"/>
               </p:ext>
             </p:extLst>
           </p:nvPr>
         </p:nvGraphicFramePr>
         <p:xfrm>
-          <a:off x="119240" y="4975450"/>
-          <a:ext cx="11965278" cy="1828800"/>
+          <a:off x="94279" y="4345449"/>
+          <a:ext cx="11965278" cy="2438400"/>
         </p:xfrm>
         <a:graphic>
           <a:graphicData uri="http://schemas.openxmlformats.org/drawingml/2006/table">
@@ -4650,6 +4650,56 @@
                 <a:extLst>
                   <a:ext uri="{0D108BD9-81ED-4DB2-BD59-A6C34878D82A}">
                     <a16:rowId xmlns:a16="http://schemas.microsoft.com/office/drawing/2014/main" val="2056826157"/>
+                  </a:ext>
+                </a:extLst>
+              </a:tr>
+              <a:tr h="255166">
+                <a:tc>
+                  <a:txBody>
+                    <a:bodyPr/>
+                    <a:lstStyle/>
+                    <a:p>
+                      <a:r>
+                        <a:rPr lang="en-US" sz="1400" dirty="0"/>
+                        <a:t>Administrator</a:t>
+                      </a:r>
+                    </a:p>
+                  </a:txBody>
+                  <a:tcPr/>
+                </a:tc>
+                <a:tc>
+                  <a:txBody>
+                    <a:bodyPr/>
+                    <a:lstStyle/>
+                    <a:p>
+                      <a:pPr marL="0" marR="0" lvl="0" indent="0" algn="l" defTabSz="914400" rtl="0" eaLnBrk="1" fontAlgn="auto" latinLnBrk="0" hangingPunct="1">
+                        <a:lnSpc>
+                          <a:spcPct val="100000"/>
+                        </a:lnSpc>
+                        <a:spcBef>
+                          <a:spcPts val="0"/>
+                        </a:spcBef>
+                        <a:spcAft>
+                          <a:spcPts val="0"/>
+                        </a:spcAft>
+                        <a:buClrTx/>
+                        <a:buSzTx/>
+                        <a:buFontTx/>
+                        <a:buNone/>
+                        <a:tabLst/>
+                        <a:defRPr/>
+                      </a:pPr>
+                      <a:r>
+                        <a:rPr lang="en-US" sz="1400" dirty="0"/>
+                        <a:t>This role enables a user with it to administer organizations, users, and roles</a:t>
+                      </a:r>
+                    </a:p>
+                  </a:txBody>
+                  <a:tcPr/>
+                </a:tc>
+                <a:extLst>
+                  <a:ext uri="{0D108BD9-81ED-4DB2-BD59-A6C34878D82A}">
+                    <a16:rowId xmlns:a16="http://schemas.microsoft.com/office/drawing/2014/main" val="2568220106"/>
                   </a:ext>
                 </a:extLst>
               </a:tr>
@@ -4794,7 +4844,7 @@
                     <a:p>
                       <a:r>
                         <a:rPr lang="en-US" sz="1400" dirty="0"/>
-                        <a:t>Qualifier</a:t>
+                        <a:t>Qualifier Step 1</a:t>
                       </a:r>
                     </a:p>
                   </a:txBody>
@@ -4824,7 +4874,7 @@
                       </a:pPr>
                       <a:r>
                         <a:rPr lang="en-US" sz="1400" dirty="0"/>
-                        <a:t>This role enables a user with it to leverage the data on the zakat form to make an eligibility ruling on the zakat case</a:t>
+                        <a:t>This role enables a user with it to leverage the data on the zakat form to make an eligibility ruling on the zakat case (qualifier step 1)</a:t>
                       </a:r>
                     </a:p>
                   </a:txBody>
@@ -4844,7 +4894,7 @@
                     <a:p>
                       <a:r>
                         <a:rPr lang="en-US" sz="1400" dirty="0"/>
-                        <a:t>Administrator</a:t>
+                        <a:t>Qualifier Step 2</a:t>
                       </a:r>
                     </a:p>
                   </a:txBody>
@@ -4874,7 +4924,7 @@
                       </a:pPr>
                       <a:r>
                         <a:rPr lang="en-US" sz="1400" dirty="0"/>
-                        <a:t>This role enables a user with it to administer organizations, users, and roles</a:t>
+                        <a:t>This role enables a user with it to leverage the data on the zakat form to make an eligibility ruling on the zakat case (qualifier step 2)</a:t>
                       </a:r>
                     </a:p>
                   </a:txBody>
@@ -4882,7 +4932,57 @@
                 </a:tc>
                 <a:extLst>
                   <a:ext uri="{0D108BD9-81ED-4DB2-BD59-A6C34878D82A}">
-                    <a16:rowId xmlns:a16="http://schemas.microsoft.com/office/drawing/2014/main" val="4166663379"/>
+                    <a16:rowId xmlns:a16="http://schemas.microsoft.com/office/drawing/2014/main" val="3062147874"/>
+                  </a:ext>
+                </a:extLst>
+              </a:tr>
+              <a:tr h="255166">
+                <a:tc>
+                  <a:txBody>
+                    <a:bodyPr/>
+                    <a:lstStyle/>
+                    <a:p>
+                      <a:r>
+                        <a:rPr lang="en-US" sz="1400" dirty="0"/>
+                        <a:t>Financier</a:t>
+                      </a:r>
+                    </a:p>
+                  </a:txBody>
+                  <a:tcPr/>
+                </a:tc>
+                <a:tc>
+                  <a:txBody>
+                    <a:bodyPr/>
+                    <a:lstStyle/>
+                    <a:p>
+                      <a:pPr marL="0" marR="0" lvl="0" indent="0" algn="l" defTabSz="914400" rtl="0" eaLnBrk="1" fontAlgn="auto" latinLnBrk="0" hangingPunct="1">
+                        <a:lnSpc>
+                          <a:spcPct val="100000"/>
+                        </a:lnSpc>
+                        <a:spcBef>
+                          <a:spcPts val="0"/>
+                        </a:spcBef>
+                        <a:spcAft>
+                          <a:spcPts val="0"/>
+                        </a:spcAft>
+                        <a:buClrTx/>
+                        <a:buSzTx/>
+                        <a:buFontTx/>
+                        <a:buNone/>
+                        <a:tabLst/>
+                        <a:defRPr/>
+                      </a:pPr>
+                      <a:r>
+                        <a:rPr lang="en-US" sz="1400" dirty="0"/>
+                        <a:t>This role provides a user the ability to be notified about an approved zakat application so that funds can be dispersed</a:t>
+                      </a:r>
+                    </a:p>
+                  </a:txBody>
+                  <a:tcPr/>
+                </a:tc>
+                <a:extLst>
+                  <a:ext uri="{0D108BD9-81ED-4DB2-BD59-A6C34878D82A}">
+                    <a16:rowId xmlns:a16="http://schemas.microsoft.com/office/drawing/2014/main" val="85507403"/>
                   </a:ext>
                 </a:extLst>
               </a:tr>
@@ -4905,13 +5005,13 @@
           <p:nvPr>
             <p:extLst>
               <p:ext uri="{D42A27DB-BD31-4B8C-83A1-F6EECF244321}">
-                <p14:modId xmlns:p14="http://schemas.microsoft.com/office/powerpoint/2010/main" val="4101517247"/>
+                <p14:modId xmlns:p14="http://schemas.microsoft.com/office/powerpoint/2010/main" val="3143788738"/>
               </p:ext>
             </p:extLst>
           </p:nvPr>
         </p:nvGraphicFramePr>
         <p:xfrm>
-          <a:off x="119240" y="4609703"/>
+          <a:off x="94279" y="3975134"/>
           <a:ext cx="11965278" cy="365760"/>
         </p:xfrm>
         <a:graphic>
@@ -4985,7 +5085,7 @@
         </p:nvSpPr>
         <p:spPr>
           <a:xfrm>
-            <a:off x="1988528" y="3379929"/>
+            <a:off x="1988528" y="3294645"/>
             <a:ext cx="914400" cy="640080"/>
           </a:xfrm>
           <a:prstGeom prst="rect">
@@ -5036,7 +5136,7 @@
         </p:nvCxnSpPr>
         <p:spPr>
           <a:xfrm rot="5400000">
-            <a:off x="2832778" y="2481671"/>
+            <a:off x="2832778" y="2396387"/>
             <a:ext cx="511209" cy="1285307"/>
           </a:xfrm>
           <a:prstGeom prst="bentConnector3">
@@ -5078,7 +5178,7 @@
         </p:nvSpPr>
         <p:spPr>
           <a:xfrm>
-            <a:off x="5630635" y="2228640"/>
+            <a:off x="5630635" y="2143356"/>
             <a:ext cx="914400" cy="640080"/>
           </a:xfrm>
           <a:prstGeom prst="rect">
@@ -5133,7 +5233,7 @@
         </p:nvCxnSpPr>
         <p:spPr>
           <a:xfrm rot="16200000" flipH="1">
-            <a:off x="5893600" y="2034405"/>
+            <a:off x="5893600" y="1949121"/>
             <a:ext cx="387008" cy="1461"/>
           </a:xfrm>
           <a:prstGeom prst="bentConnector3">
@@ -5178,7 +5278,7 @@
         </p:nvCxnSpPr>
         <p:spPr>
           <a:xfrm flipV="1">
-            <a:off x="4188235" y="3692886"/>
+            <a:off x="4188235" y="3607602"/>
             <a:ext cx="374367" cy="4813"/>
           </a:xfrm>
           <a:prstGeom prst="bentConnector3">
@@ -5223,7 +5323,7 @@
         </p:nvCxnSpPr>
         <p:spPr>
           <a:xfrm flipH="1">
-            <a:off x="5477002" y="416290"/>
+            <a:off x="5477002" y="331006"/>
             <a:ext cx="1060223" cy="3276596"/>
           </a:xfrm>
           <a:prstGeom prst="bentConnector3">
@@ -5264,7 +5364,7 @@
         </p:nvSpPr>
         <p:spPr>
           <a:xfrm>
-            <a:off x="5483085" y="3429344"/>
+            <a:off x="5483085" y="3344060"/>
             <a:ext cx="1347537" cy="253916"/>
           </a:xfrm>
           <a:prstGeom prst="rect">

</xml_diff>